<commit_message>
updated a lot of stuff. New Structure is here. Now isn't that great.
</commit_message>
<xml_diff>
--- a/Vorstellung/VorstellungPics/PicturesForTalk.pptx
+++ b/Vorstellung/VorstellungPics/PicturesForTalk.pptx
@@ -11,6 +11,7 @@
     <p:sldId id="259" r:id="rId5"/>
     <p:sldId id="260" r:id="rId6"/>
     <p:sldId id="261" r:id="rId7"/>
+    <p:sldId id="262" r:id="rId8"/>
   </p:sldIdLst>
   <p:sldSz cx="12192000" cy="6858000"/>
   <p:notesSz cx="6858000" cy="9144000"/>
@@ -120,7 +121,7 @@
 <file path=ppt/revisionInfo.xml><?xml version="1.0" encoding="utf-8"?>
 <p1510:revInfo xmlns:a="http://schemas.openxmlformats.org/drawingml/2006/main" xmlns:r="http://schemas.openxmlformats.org/officeDocument/2006/relationships" xmlns:p1510="http://schemas.microsoft.com/office/powerpoint/2015/10/main">
   <p1510:revLst>
-    <p1510:client id="{8FF851C9-377C-46D5-8B90-A96ECABD9679}" v="24" dt="2024-02-22T14:28:51.735"/>
+    <p1510:client id="{8FF851C9-377C-46D5-8B90-A96ECABD9679}" v="40" dt="2024-02-27T18:54:09.005"/>
   </p1510:revLst>
 </p1510:revInfo>
 </file>
@@ -129,8 +130,8 @@
 <pc:chgInfo xmlns:a="http://schemas.openxmlformats.org/drawingml/2006/main" xmlns:r="http://schemas.openxmlformats.org/officeDocument/2006/relationships" xmlns:ac="http://schemas.microsoft.com/office/drawing/2013/main/command" xmlns:pc="http://schemas.microsoft.com/office/powerpoint/2013/main/command">
   <pc:docChgLst>
     <pc:chgData name="Markus Parhofer" userId="9100c6bed19c68c7" providerId="LiveId" clId="{8FF851C9-377C-46D5-8B90-A96ECABD9679}"/>
-    <pc:docChg chg="undo custSel modSld">
-      <pc:chgData name="Markus Parhofer" userId="9100c6bed19c68c7" providerId="LiveId" clId="{8FF851C9-377C-46D5-8B90-A96ECABD9679}" dt="2024-02-22T14:28:51.735" v="132"/>
+    <pc:docChg chg="undo custSel addSld modSld">
+      <pc:chgData name="Markus Parhofer" userId="9100c6bed19c68c7" providerId="LiveId" clId="{8FF851C9-377C-46D5-8B90-A96ECABD9679}" dt="2024-02-27T18:54:09.005" v="249"/>
       <pc:docMkLst>
         <pc:docMk/>
       </pc:docMkLst>
@@ -450,6 +451,172 @@
           </ac:picMkLst>
         </pc:picChg>
       </pc:sldChg>
+      <pc:sldChg chg="addSp delSp modSp mod setBg">
+        <pc:chgData name="Markus Parhofer" userId="9100c6bed19c68c7" providerId="LiveId" clId="{8FF851C9-377C-46D5-8B90-A96ECABD9679}" dt="2024-02-27T14:34:42.718" v="243" actId="164"/>
+        <pc:sldMkLst>
+          <pc:docMk/>
+          <pc:sldMk cId="1674188416" sldId="261"/>
+        </pc:sldMkLst>
+        <pc:spChg chg="add del">
+          <ac:chgData name="Markus Parhofer" userId="9100c6bed19c68c7" providerId="LiveId" clId="{8FF851C9-377C-46D5-8B90-A96ECABD9679}" dt="2024-02-27T14:25:22.903" v="143" actId="26606"/>
+          <ac:spMkLst>
+            <pc:docMk/>
+            <pc:sldMk cId="1674188416" sldId="261"/>
+            <ac:spMk id="12" creationId="{799448F2-0E5B-42DA-B2D1-11A14E947BD4}"/>
+          </ac:spMkLst>
+        </pc:spChg>
+        <pc:spChg chg="add del">
+          <ac:chgData name="Markus Parhofer" userId="9100c6bed19c68c7" providerId="LiveId" clId="{8FF851C9-377C-46D5-8B90-A96ECABD9679}" dt="2024-02-27T14:25:22.903" v="143" actId="26606"/>
+          <ac:spMkLst>
+            <pc:docMk/>
+            <pc:sldMk cId="1674188416" sldId="261"/>
+            <ac:spMk id="14" creationId="{4E8A7552-20E1-4F34-ADAB-C1DB6634D47E}"/>
+          </ac:spMkLst>
+        </pc:spChg>
+        <pc:grpChg chg="add mod">
+          <ac:chgData name="Markus Parhofer" userId="9100c6bed19c68c7" providerId="LiveId" clId="{8FF851C9-377C-46D5-8B90-A96ECABD9679}" dt="2024-02-27T14:33:36.155" v="233" actId="164"/>
+          <ac:grpSpMkLst>
+            <pc:docMk/>
+            <pc:sldMk cId="1674188416" sldId="261"/>
+            <ac:grpSpMk id="11" creationId="{185644F3-B22A-7549-9841-70847166A14F}"/>
+          </ac:grpSpMkLst>
+        </pc:grpChg>
+        <pc:grpChg chg="add mod">
+          <ac:chgData name="Markus Parhofer" userId="9100c6bed19c68c7" providerId="LiveId" clId="{8FF851C9-377C-46D5-8B90-A96ECABD9679}" dt="2024-02-27T14:34:42.718" v="243" actId="164"/>
+          <ac:grpSpMkLst>
+            <pc:docMk/>
+            <pc:sldMk cId="1674188416" sldId="261"/>
+            <ac:grpSpMk id="15" creationId="{C4B8A790-F751-5E65-959B-EA7E92AFD680}"/>
+          </ac:grpSpMkLst>
+        </pc:grpChg>
+        <pc:grpChg chg="add mod">
+          <ac:chgData name="Markus Parhofer" userId="9100c6bed19c68c7" providerId="LiveId" clId="{8FF851C9-377C-46D5-8B90-A96ECABD9679}" dt="2024-02-27T14:34:42.718" v="243" actId="164"/>
+          <ac:grpSpMkLst>
+            <pc:docMk/>
+            <pc:sldMk cId="1674188416" sldId="261"/>
+            <ac:grpSpMk id="22" creationId="{65E89E88-7F7D-9052-8399-2FC98373ACAC}"/>
+          </ac:grpSpMkLst>
+        </pc:grpChg>
+        <pc:picChg chg="add mod ord">
+          <ac:chgData name="Markus Parhofer" userId="9100c6bed19c68c7" providerId="LiveId" clId="{8FF851C9-377C-46D5-8B90-A96ECABD9679}" dt="2024-02-27T14:31:48.867" v="211" actId="164"/>
+          <ac:picMkLst>
+            <pc:docMk/>
+            <pc:sldMk cId="1674188416" sldId="261"/>
+            <ac:picMk id="3" creationId="{C2B289E7-6F4A-B77C-9D87-34DE5D263C35}"/>
+          </ac:picMkLst>
+        </pc:picChg>
+        <pc:picChg chg="add mod modCrop">
+          <ac:chgData name="Markus Parhofer" userId="9100c6bed19c68c7" providerId="LiveId" clId="{8FF851C9-377C-46D5-8B90-A96ECABD9679}" dt="2024-02-27T14:34:42.718" v="243" actId="164"/>
+          <ac:picMkLst>
+            <pc:docMk/>
+            <pc:sldMk cId="1674188416" sldId="261"/>
+            <ac:picMk id="5" creationId="{30E4936D-7357-32FB-9A7F-63392B68C172}"/>
+          </ac:picMkLst>
+        </pc:picChg>
+        <pc:picChg chg="add mod ord modCrop">
+          <ac:chgData name="Markus Parhofer" userId="9100c6bed19c68c7" providerId="LiveId" clId="{8FF851C9-377C-46D5-8B90-A96ECABD9679}" dt="2024-02-27T14:34:42.718" v="243" actId="164"/>
+          <ac:picMkLst>
+            <pc:docMk/>
+            <pc:sldMk cId="1674188416" sldId="261"/>
+            <ac:picMk id="7" creationId="{6B57DB69-5F5E-7EB8-A75F-A036543E8111}"/>
+          </ac:picMkLst>
+        </pc:picChg>
+        <pc:picChg chg="add del mod">
+          <ac:chgData name="Markus Parhofer" userId="9100c6bed19c68c7" providerId="LiveId" clId="{8FF851C9-377C-46D5-8B90-A96ECABD9679}" dt="2024-02-27T14:28:10.535" v="175" actId="478"/>
+          <ac:picMkLst>
+            <pc:docMk/>
+            <pc:sldMk cId="1674188416" sldId="261"/>
+            <ac:picMk id="8" creationId="{BB291BA1-D8ED-71FE-6DA5-F3A4BBC34BF4}"/>
+          </ac:picMkLst>
+        </pc:picChg>
+        <pc:picChg chg="add del mod">
+          <ac:chgData name="Markus Parhofer" userId="9100c6bed19c68c7" providerId="LiveId" clId="{8FF851C9-377C-46D5-8B90-A96ECABD9679}" dt="2024-02-27T14:28:52.348" v="182" actId="478"/>
+          <ac:picMkLst>
+            <pc:docMk/>
+            <pc:sldMk cId="1674188416" sldId="261"/>
+            <ac:picMk id="9" creationId="{BD3F39E3-5B6B-B4AA-7558-3F0D4C3DCB82}"/>
+          </ac:picMkLst>
+        </pc:picChg>
+        <pc:picChg chg="add mod">
+          <ac:chgData name="Markus Parhofer" userId="9100c6bed19c68c7" providerId="LiveId" clId="{8FF851C9-377C-46D5-8B90-A96ECABD9679}" dt="2024-02-27T14:31:48.867" v="211" actId="164"/>
+          <ac:picMkLst>
+            <pc:docMk/>
+            <pc:sldMk cId="1674188416" sldId="261"/>
+            <ac:picMk id="10" creationId="{5391A538-F610-3965-91FF-0AAFB5270C6B}"/>
+          </ac:picMkLst>
+        </pc:picChg>
+        <pc:picChg chg="add mod">
+          <ac:chgData name="Markus Parhofer" userId="9100c6bed19c68c7" providerId="LiveId" clId="{8FF851C9-377C-46D5-8B90-A96ECABD9679}" dt="2024-02-27T14:33:36.155" v="233" actId="164"/>
+          <ac:picMkLst>
+            <pc:docMk/>
+            <pc:sldMk cId="1674188416" sldId="261"/>
+            <ac:picMk id="13" creationId="{04AEC95E-A8BF-F385-9553-9303C4CC46EE}"/>
+          </ac:picMkLst>
+        </pc:picChg>
+        <pc:cxnChg chg="add del">
+          <ac:chgData name="Markus Parhofer" userId="9100c6bed19c68c7" providerId="LiveId" clId="{8FF851C9-377C-46D5-8B90-A96ECABD9679}" dt="2024-02-27T14:25:29.048" v="145" actId="26606"/>
+          <ac:cxnSpMkLst>
+            <pc:docMk/>
+            <pc:sldMk cId="1674188416" sldId="261"/>
+            <ac:cxnSpMk id="16" creationId="{DCD67800-37AC-4E14-89B0-F79DCB3FB86D}"/>
+          </ac:cxnSpMkLst>
+        </pc:cxnChg>
+        <pc:cxnChg chg="add del">
+          <ac:chgData name="Markus Parhofer" userId="9100c6bed19c68c7" providerId="LiveId" clId="{8FF851C9-377C-46D5-8B90-A96ECABD9679}" dt="2024-02-27T14:25:29.048" v="145" actId="26606"/>
+          <ac:cxnSpMkLst>
+            <pc:docMk/>
+            <pc:sldMk cId="1674188416" sldId="261"/>
+            <ac:cxnSpMk id="17" creationId="{20F1788F-A5AE-4188-8274-F7F2E3833ECD}"/>
+          </ac:cxnSpMkLst>
+        </pc:cxnChg>
+        <pc:cxnChg chg="add mod">
+          <ac:chgData name="Markus Parhofer" userId="9100c6bed19c68c7" providerId="LiveId" clId="{8FF851C9-377C-46D5-8B90-A96ECABD9679}" dt="2024-02-27T14:34:42.718" v="243" actId="164"/>
+          <ac:cxnSpMkLst>
+            <pc:docMk/>
+            <pc:sldMk cId="1674188416" sldId="261"/>
+            <ac:cxnSpMk id="19" creationId="{E85D5942-4C41-BAA0-60DC-7DBAD9134361}"/>
+          </ac:cxnSpMkLst>
+        </pc:cxnChg>
+        <pc:cxnChg chg="add mod">
+          <ac:chgData name="Markus Parhofer" userId="9100c6bed19c68c7" providerId="LiveId" clId="{8FF851C9-377C-46D5-8B90-A96ECABD9679}" dt="2024-02-27T14:34:42.718" v="243" actId="164"/>
+          <ac:cxnSpMkLst>
+            <pc:docMk/>
+            <pc:sldMk cId="1674188416" sldId="261"/>
+            <ac:cxnSpMk id="21" creationId="{CA10F391-D131-1E1E-8685-177B50F97223}"/>
+          </ac:cxnSpMkLst>
+        </pc:cxnChg>
+      </pc:sldChg>
+      <pc:sldChg chg="addSp delSp modSp new">
+        <pc:chgData name="Markus Parhofer" userId="9100c6bed19c68c7" providerId="LiveId" clId="{8FF851C9-377C-46D5-8B90-A96ECABD9679}" dt="2024-02-27T18:54:09.005" v="249"/>
+        <pc:sldMkLst>
+          <pc:docMk/>
+          <pc:sldMk cId="3427518050" sldId="262"/>
+        </pc:sldMkLst>
+        <pc:spChg chg="add del mod">
+          <ac:chgData name="Markus Parhofer" userId="9100c6bed19c68c7" providerId="LiveId" clId="{8FF851C9-377C-46D5-8B90-A96ECABD9679}" dt="2024-02-27T18:53:59" v="247" actId="478"/>
+          <ac:spMkLst>
+            <pc:docMk/>
+            <pc:sldMk cId="3427518050" sldId="262"/>
+            <ac:spMk id="2" creationId="{F74A9D3A-59A7-2828-A000-4F953106E25E}"/>
+          </ac:spMkLst>
+        </pc:spChg>
+        <pc:spChg chg="add del">
+          <ac:chgData name="Markus Parhofer" userId="9100c6bed19c68c7" providerId="LiveId" clId="{8FF851C9-377C-46D5-8B90-A96ECABD9679}" dt="2024-02-27T18:53:59" v="247" actId="478"/>
+          <ac:spMkLst>
+            <pc:docMk/>
+            <pc:sldMk cId="3427518050" sldId="262"/>
+            <ac:spMk id="3" creationId="{87F00451-941A-F3EB-5677-54E742671425}"/>
+          </ac:spMkLst>
+        </pc:spChg>
+        <pc:spChg chg="add mod">
+          <ac:chgData name="Markus Parhofer" userId="9100c6bed19c68c7" providerId="LiveId" clId="{8FF851C9-377C-46D5-8B90-A96ECABD9679}" dt="2024-02-27T18:54:09.005" v="249"/>
+          <ac:spMkLst>
+            <pc:docMk/>
+            <pc:sldMk cId="3427518050" sldId="262"/>
+            <ac:spMk id="4" creationId="{77E43016-4089-C5D0-9FDA-5C661C3727DC}"/>
+          </ac:spMkLst>
+        </pc:spChg>
+      </pc:sldChg>
     </pc:docChg>
   </pc:docChgLst>
   <pc:docChgLst>
@@ -719,7 +886,7 @@
           <a:p>
             <a:fld id="{855AA24D-F6B8-45CE-A0D3-39EA9EEEA192}" type="datetimeFigureOut">
               <a:rPr lang="de-DE" smtClean="0"/>
-              <a:t>22.02.2024</a:t>
+              <a:t>27.02.2024</a:t>
             </a:fld>
             <a:endParaRPr lang="de-DE"/>
           </a:p>
@@ -917,7 +1084,7 @@
           <a:p>
             <a:fld id="{855AA24D-F6B8-45CE-A0D3-39EA9EEEA192}" type="datetimeFigureOut">
               <a:rPr lang="de-DE" smtClean="0"/>
-              <a:t>22.02.2024</a:t>
+              <a:t>27.02.2024</a:t>
             </a:fld>
             <a:endParaRPr lang="de-DE"/>
           </a:p>
@@ -1125,7 +1292,7 @@
           <a:p>
             <a:fld id="{855AA24D-F6B8-45CE-A0D3-39EA9EEEA192}" type="datetimeFigureOut">
               <a:rPr lang="de-DE" smtClean="0"/>
-              <a:t>22.02.2024</a:t>
+              <a:t>27.02.2024</a:t>
             </a:fld>
             <a:endParaRPr lang="de-DE"/>
           </a:p>
@@ -1323,7 +1490,7 @@
           <a:p>
             <a:fld id="{855AA24D-F6B8-45CE-A0D3-39EA9EEEA192}" type="datetimeFigureOut">
               <a:rPr lang="de-DE" smtClean="0"/>
-              <a:t>22.02.2024</a:t>
+              <a:t>27.02.2024</a:t>
             </a:fld>
             <a:endParaRPr lang="de-DE"/>
           </a:p>
@@ -1598,7 +1765,7 @@
           <a:p>
             <a:fld id="{855AA24D-F6B8-45CE-A0D3-39EA9EEEA192}" type="datetimeFigureOut">
               <a:rPr lang="de-DE" smtClean="0"/>
-              <a:t>22.02.2024</a:t>
+              <a:t>27.02.2024</a:t>
             </a:fld>
             <a:endParaRPr lang="de-DE"/>
           </a:p>
@@ -1863,7 +2030,7 @@
           <a:p>
             <a:fld id="{855AA24D-F6B8-45CE-A0D3-39EA9EEEA192}" type="datetimeFigureOut">
               <a:rPr lang="de-DE" smtClean="0"/>
-              <a:t>22.02.2024</a:t>
+              <a:t>27.02.2024</a:t>
             </a:fld>
             <a:endParaRPr lang="de-DE"/>
           </a:p>
@@ -2275,7 +2442,7 @@
           <a:p>
             <a:fld id="{855AA24D-F6B8-45CE-A0D3-39EA9EEEA192}" type="datetimeFigureOut">
               <a:rPr lang="de-DE" smtClean="0"/>
-              <a:t>22.02.2024</a:t>
+              <a:t>27.02.2024</a:t>
             </a:fld>
             <a:endParaRPr lang="de-DE"/>
           </a:p>
@@ -2416,7 +2583,7 @@
           <a:p>
             <a:fld id="{855AA24D-F6B8-45CE-A0D3-39EA9EEEA192}" type="datetimeFigureOut">
               <a:rPr lang="de-DE" smtClean="0"/>
-              <a:t>22.02.2024</a:t>
+              <a:t>27.02.2024</a:t>
             </a:fld>
             <a:endParaRPr lang="de-DE"/>
           </a:p>
@@ -2529,7 +2696,7 @@
           <a:p>
             <a:fld id="{855AA24D-F6B8-45CE-A0D3-39EA9EEEA192}" type="datetimeFigureOut">
               <a:rPr lang="de-DE" smtClean="0"/>
-              <a:t>22.02.2024</a:t>
+              <a:t>27.02.2024</a:t>
             </a:fld>
             <a:endParaRPr lang="de-DE"/>
           </a:p>
@@ -2840,7 +3007,7 @@
           <a:p>
             <a:fld id="{855AA24D-F6B8-45CE-A0D3-39EA9EEEA192}" type="datetimeFigureOut">
               <a:rPr lang="de-DE" smtClean="0"/>
-              <a:t>22.02.2024</a:t>
+              <a:t>27.02.2024</a:t>
             </a:fld>
             <a:endParaRPr lang="de-DE"/>
           </a:p>
@@ -3128,7 +3295,7 @@
           <a:p>
             <a:fld id="{855AA24D-F6B8-45CE-A0D3-39EA9EEEA192}" type="datetimeFigureOut">
               <a:rPr lang="de-DE" smtClean="0"/>
-              <a:t>22.02.2024</a:t>
+              <a:t>27.02.2024</a:t>
             </a:fld>
             <a:endParaRPr lang="de-DE"/>
           </a:p>
@@ -3369,7 +3536,7 @@
           <a:p>
             <a:fld id="{855AA24D-F6B8-45CE-A0D3-39EA9EEEA192}" type="datetimeFigureOut">
               <a:rPr lang="de-DE" smtClean="0"/>
-              <a:t>22.02.2024</a:t>
+              <a:t>27.02.2024</a:t>
             </a:fld>
             <a:endParaRPr lang="de-DE"/>
           </a:p>
@@ -9336,10 +9503,491 @@
           <a:chExt cx="0" cy="0"/>
         </a:xfrm>
       </p:grpSpPr>
+      <p:grpSp>
+        <p:nvGrpSpPr>
+          <p:cNvPr id="22" name="Gruppieren 21">
+            <a:extLst>
+              <a:ext uri="{FF2B5EF4-FFF2-40B4-BE49-F238E27FC236}">
+                <a16:creationId xmlns:a16="http://schemas.microsoft.com/office/drawing/2014/main" id="{65E89E88-7F7D-9052-8399-2FC98373ACAC}"/>
+              </a:ext>
+            </a:extLst>
+          </p:cNvPr>
+          <p:cNvGrpSpPr/>
+          <p:nvPr/>
+        </p:nvGrpSpPr>
+        <p:grpSpPr>
+          <a:xfrm>
+            <a:off x="607858" y="624706"/>
+            <a:ext cx="11412357" cy="5227608"/>
+            <a:chOff x="607858" y="624706"/>
+            <a:chExt cx="11412357" cy="5227608"/>
+          </a:xfrm>
+        </p:grpSpPr>
+        <p:pic>
+          <p:nvPicPr>
+            <p:cNvPr id="5" name="Grafik 4" descr="Ein Bild, das Text, Screenshot, Schrift, Zahl enthält.&#10;&#10;Automatisch generierte Beschreibung">
+              <a:extLst>
+                <a:ext uri="{FF2B5EF4-FFF2-40B4-BE49-F238E27FC236}">
+                  <a16:creationId xmlns:a16="http://schemas.microsoft.com/office/drawing/2014/main" id="{30E4936D-7357-32FB-9A7F-63392B68C172}"/>
+                </a:ext>
+              </a:extLst>
+            </p:cNvPr>
+            <p:cNvPicPr>
+              <a:picLocks noChangeAspect="1"/>
+            </p:cNvPicPr>
+            <p:nvPr/>
+          </p:nvPicPr>
+          <p:blipFill rotWithShape="1">
+            <a:blip r:embed="rId2">
+              <a:extLst>
+                <a:ext uri="{28A0092B-C50C-407E-A947-70E740481C1C}">
+                  <a14:useLocalDpi xmlns:a14="http://schemas.microsoft.com/office/drawing/2010/main" val="0"/>
+                </a:ext>
+              </a:extLst>
+            </a:blip>
+            <a:srcRect l="43924" t="11025" r="13615" b="46993"/>
+            <a:stretch/>
+          </p:blipFill>
+          <p:spPr>
+            <a:xfrm>
+              <a:off x="9880696" y="891618"/>
+              <a:ext cx="2139519" cy="1599530"/>
+            </a:xfrm>
+            <a:prstGeom prst="ellipse">
+              <a:avLst/>
+            </a:prstGeom>
+            <a:ln>
+              <a:solidFill>
+                <a:schemeClr val="tx1"/>
+              </a:solidFill>
+            </a:ln>
+          </p:spPr>
+        </p:pic>
+        <p:pic>
+          <p:nvPicPr>
+            <p:cNvPr id="7" name="Grafik 6" descr="Ein Bild, das Text, Screenshot, Schrift, Zahl enthält.&#10;&#10;Automatisch generierte Beschreibung">
+              <a:extLst>
+                <a:ext uri="{FF2B5EF4-FFF2-40B4-BE49-F238E27FC236}">
+                  <a16:creationId xmlns:a16="http://schemas.microsoft.com/office/drawing/2014/main" id="{6B57DB69-5F5E-7EB8-A75F-A036543E8111}"/>
+                </a:ext>
+              </a:extLst>
+            </p:cNvPr>
+            <p:cNvPicPr>
+              <a:picLocks noChangeAspect="1"/>
+            </p:cNvPicPr>
+            <p:nvPr/>
+          </p:nvPicPr>
+          <p:blipFill rotWithShape="1">
+            <a:blip r:embed="rId3">
+              <a:extLst>
+                <a:ext uri="{28A0092B-C50C-407E-A947-70E740481C1C}">
+                  <a14:useLocalDpi xmlns:a14="http://schemas.microsoft.com/office/drawing/2010/main" val="0"/>
+                </a:ext>
+              </a:extLst>
+            </a:blip>
+            <a:srcRect l="34228" t="10291" r="23311" b="47728"/>
+            <a:stretch/>
+          </p:blipFill>
+          <p:spPr>
+            <a:xfrm>
+              <a:off x="9880695" y="3238510"/>
+              <a:ext cx="2139519" cy="1599530"/>
+            </a:xfrm>
+            <a:prstGeom prst="ellipse">
+              <a:avLst/>
+            </a:prstGeom>
+            <a:ln>
+              <a:solidFill>
+                <a:schemeClr val="tx1"/>
+              </a:solidFill>
+            </a:ln>
+          </p:spPr>
+        </p:pic>
+        <p:grpSp>
+          <p:nvGrpSpPr>
+            <p:cNvPr id="15" name="Gruppieren 14">
+              <a:extLst>
+                <a:ext uri="{FF2B5EF4-FFF2-40B4-BE49-F238E27FC236}">
+                  <a16:creationId xmlns:a16="http://schemas.microsoft.com/office/drawing/2014/main" id="{C4B8A790-F751-5E65-959B-EA7E92AFD680}"/>
+                </a:ext>
+              </a:extLst>
+            </p:cNvPr>
+            <p:cNvGrpSpPr/>
+            <p:nvPr/>
+          </p:nvGrpSpPr>
+          <p:grpSpPr>
+            <a:xfrm>
+              <a:off x="607858" y="624706"/>
+              <a:ext cx="8441577" cy="5227608"/>
+              <a:chOff x="-1291963" y="815196"/>
+              <a:chExt cx="8441577" cy="5227608"/>
+            </a:xfrm>
+          </p:grpSpPr>
+          <p:grpSp>
+            <p:nvGrpSpPr>
+              <p:cNvPr id="11" name="Gruppieren 10">
+                <a:extLst>
+                  <a:ext uri="{FF2B5EF4-FFF2-40B4-BE49-F238E27FC236}">
+                    <a16:creationId xmlns:a16="http://schemas.microsoft.com/office/drawing/2014/main" id="{185644F3-B22A-7549-9841-70847166A14F}"/>
+                  </a:ext>
+                </a:extLst>
+              </p:cNvPr>
+              <p:cNvGrpSpPr/>
+              <p:nvPr/>
+            </p:nvGrpSpPr>
+            <p:grpSpPr>
+              <a:xfrm>
+                <a:off x="-1291963" y="815196"/>
+                <a:ext cx="8441577" cy="5227608"/>
+                <a:chOff x="-1291963" y="815196"/>
+                <a:chExt cx="8441577" cy="5227608"/>
+              </a:xfrm>
+            </p:grpSpPr>
+            <p:pic>
+              <p:nvPicPr>
+                <p:cNvPr id="3" name="Grafik 2" descr="Ein Bild, das Text, Zahl, Schrift, Reihe enthält.&#10;&#10;Automatisch generierte Beschreibung">
+                  <a:extLst>
+                    <a:ext uri="{FF2B5EF4-FFF2-40B4-BE49-F238E27FC236}">
+                      <a16:creationId xmlns:a16="http://schemas.microsoft.com/office/drawing/2014/main" id="{C2B289E7-6F4A-B77C-9D87-34DE5D263C35}"/>
+                    </a:ext>
+                  </a:extLst>
+                </p:cNvPr>
+                <p:cNvPicPr>
+                  <a:picLocks noChangeAspect="1"/>
+                </p:cNvPicPr>
+                <p:nvPr/>
+              </p:nvPicPr>
+              <p:blipFill>
+                <a:blip r:embed="rId4">
+                  <a:extLst>
+                    <a:ext uri="{28A0092B-C50C-407E-A947-70E740481C1C}">
+                      <a14:useLocalDpi xmlns:a14="http://schemas.microsoft.com/office/drawing/2010/main" val="0"/>
+                    </a:ext>
+                  </a:extLst>
+                </a:blip>
+                <a:stretch>
+                  <a:fillRect/>
+                </a:stretch>
+              </p:blipFill>
+              <p:spPr>
+                <a:xfrm>
+                  <a:off x="-1291963" y="815196"/>
+                  <a:ext cx="8441577" cy="5227608"/>
+                </a:xfrm>
+                <a:prstGeom prst="rect">
+                  <a:avLst/>
+                </a:prstGeom>
+              </p:spPr>
+            </p:pic>
+            <p:pic>
+              <p:nvPicPr>
+                <p:cNvPr id="10" name="Grafik 9" descr="Ein Bild, das Text, Screenshot, Schrift, Zahl enthält.&#10;&#10;Automatisch generierte Beschreibung">
+                  <a:extLst>
+                    <a:ext uri="{FF2B5EF4-FFF2-40B4-BE49-F238E27FC236}">
+                      <a16:creationId xmlns:a16="http://schemas.microsoft.com/office/drawing/2014/main" id="{5391A538-F610-3965-91FF-0AAFB5270C6B}"/>
+                    </a:ext>
+                  </a:extLst>
+                </p:cNvPr>
+                <p:cNvPicPr>
+                  <a:picLocks noChangeAspect="1"/>
+                </p:cNvPicPr>
+                <p:nvPr/>
+              </p:nvPicPr>
+              <p:blipFill rotWithShape="1">
+                <a:blip r:embed="rId3">
+                  <a:alphaModFix amt="5000"/>
+                  <a:extLst>
+                    <a:ext uri="{28A0092B-C50C-407E-A947-70E740481C1C}">
+                      <a14:useLocalDpi xmlns:a14="http://schemas.microsoft.com/office/drawing/2010/main" val="0"/>
+                    </a:ext>
+                  </a:extLst>
+                </a:blip>
+                <a:srcRect l="34228" t="10291" r="23311" b="47728"/>
+                <a:stretch/>
+              </p:blipFill>
+              <p:spPr>
+                <a:xfrm>
+                  <a:off x="6493669" y="4849960"/>
+                  <a:ext cx="514350" cy="384535"/>
+                </a:xfrm>
+                <a:prstGeom prst="ellipse">
+                  <a:avLst/>
+                </a:prstGeom>
+                <a:ln>
+                  <a:solidFill>
+                    <a:schemeClr val="tx1"/>
+                  </a:solidFill>
+                </a:ln>
+              </p:spPr>
+            </p:pic>
+          </p:grpSp>
+          <p:pic>
+            <p:nvPicPr>
+              <p:cNvPr id="13" name="Grafik 12" descr="Ein Bild, das Text, Screenshot, Schrift, Zahl enthält.&#10;&#10;Automatisch generierte Beschreibung">
+                <a:extLst>
+                  <a:ext uri="{FF2B5EF4-FFF2-40B4-BE49-F238E27FC236}">
+                    <a16:creationId xmlns:a16="http://schemas.microsoft.com/office/drawing/2014/main" id="{04AEC95E-A8BF-F385-9553-9303C4CC46EE}"/>
+                  </a:ext>
+                </a:extLst>
+              </p:cNvPr>
+              <p:cNvPicPr>
+                <a:picLocks noChangeAspect="1"/>
+              </p:cNvPicPr>
+              <p:nvPr/>
+            </p:nvPicPr>
+            <p:blipFill rotWithShape="1">
+              <a:blip r:embed="rId2">
+                <a:alphaModFix amt="5000"/>
+                <a:extLst>
+                  <a:ext uri="{28A0092B-C50C-407E-A947-70E740481C1C}">
+                    <a14:useLocalDpi xmlns:a14="http://schemas.microsoft.com/office/drawing/2010/main" val="0"/>
+                  </a:ext>
+                </a:extLst>
+              </a:blip>
+              <a:srcRect l="43924" t="11025" r="13615" b="46993"/>
+              <a:stretch/>
+            </p:blipFill>
+            <p:spPr>
+              <a:xfrm>
+                <a:off x="-593953" y="1194923"/>
+                <a:ext cx="446316" cy="333671"/>
+              </a:xfrm>
+              <a:prstGeom prst="ellipse">
+                <a:avLst/>
+              </a:prstGeom>
+              <a:ln>
+                <a:solidFill>
+                  <a:schemeClr val="tx1"/>
+                </a:solidFill>
+              </a:ln>
+            </p:spPr>
+          </p:pic>
+        </p:grpSp>
+        <p:cxnSp>
+          <p:nvCxnSpPr>
+            <p:cNvPr id="19" name="Gerader Verbinder 18">
+              <a:extLst>
+                <a:ext uri="{FF2B5EF4-FFF2-40B4-BE49-F238E27FC236}">
+                  <a16:creationId xmlns:a16="http://schemas.microsoft.com/office/drawing/2014/main" id="{E85D5942-4C41-BAA0-60DC-7DBAD9134361}"/>
+                </a:ext>
+              </a:extLst>
+            </p:cNvPr>
+            <p:cNvCxnSpPr>
+              <a:stCxn id="13" idx="6"/>
+              <a:endCxn id="5" idx="2"/>
+            </p:cNvCxnSpPr>
+            <p:nvPr/>
+          </p:nvCxnSpPr>
+          <p:spPr>
+            <a:xfrm>
+              <a:off x="1752184" y="1171269"/>
+              <a:ext cx="8128512" cy="520114"/>
+            </a:xfrm>
+            <a:prstGeom prst="line">
+              <a:avLst/>
+            </a:prstGeom>
+            <a:ln>
+              <a:solidFill>
+                <a:schemeClr val="tx1"/>
+              </a:solidFill>
+            </a:ln>
+          </p:spPr>
+          <p:style>
+            <a:lnRef idx="1">
+              <a:schemeClr val="accent1"/>
+            </a:lnRef>
+            <a:fillRef idx="0">
+              <a:schemeClr val="accent1"/>
+            </a:fillRef>
+            <a:effectRef idx="0">
+              <a:schemeClr val="accent1"/>
+            </a:effectRef>
+            <a:fontRef idx="minor">
+              <a:schemeClr val="tx1"/>
+            </a:fontRef>
+          </p:style>
+        </p:cxnSp>
+        <p:cxnSp>
+          <p:nvCxnSpPr>
+            <p:cNvPr id="21" name="Gerader Verbinder 20">
+              <a:extLst>
+                <a:ext uri="{FF2B5EF4-FFF2-40B4-BE49-F238E27FC236}">
+                  <a16:creationId xmlns:a16="http://schemas.microsoft.com/office/drawing/2014/main" id="{CA10F391-D131-1E1E-8685-177B50F97223}"/>
+                </a:ext>
+              </a:extLst>
+            </p:cNvPr>
+            <p:cNvCxnSpPr>
+              <a:stCxn id="10" idx="6"/>
+              <a:endCxn id="7" idx="2"/>
+            </p:cNvCxnSpPr>
+            <p:nvPr/>
+          </p:nvCxnSpPr>
+          <p:spPr>
+            <a:xfrm flipV="1">
+              <a:off x="8907840" y="4038275"/>
+              <a:ext cx="972855" cy="813463"/>
+            </a:xfrm>
+            <a:prstGeom prst="line">
+              <a:avLst/>
+            </a:prstGeom>
+            <a:ln>
+              <a:solidFill>
+                <a:schemeClr val="tx1"/>
+              </a:solidFill>
+            </a:ln>
+          </p:spPr>
+          <p:style>
+            <a:lnRef idx="1">
+              <a:schemeClr val="accent1"/>
+            </a:lnRef>
+            <a:fillRef idx="0">
+              <a:schemeClr val="accent1"/>
+            </a:fillRef>
+            <a:effectRef idx="0">
+              <a:schemeClr val="accent1"/>
+            </a:effectRef>
+            <a:fontRef idx="minor">
+              <a:schemeClr val="tx1"/>
+            </a:fontRef>
+          </p:style>
+        </p:cxnSp>
+      </p:grpSp>
     </p:spTree>
     <p:extLst>
       <p:ext uri="{BB962C8B-B14F-4D97-AF65-F5344CB8AC3E}">
         <p14:creationId xmlns:p14="http://schemas.microsoft.com/office/powerpoint/2010/main" val="1674188416"/>
+      </p:ext>
+    </p:extLst>
+  </p:cSld>
+  <p:clrMapOvr>
+    <a:masterClrMapping/>
+  </p:clrMapOvr>
+</p:sld>
+</file>
+
+<file path=ppt/slides/slide7.xml><?xml version="1.0" encoding="utf-8"?>
+<p:sld xmlns:a="http://schemas.openxmlformats.org/drawingml/2006/main" xmlns:r="http://schemas.openxmlformats.org/officeDocument/2006/relationships" xmlns:p="http://schemas.openxmlformats.org/presentationml/2006/main">
+  <p:cSld>
+    <p:spTree>
+      <p:nvGrpSpPr>
+        <p:cNvPr id="1" name=""/>
+        <p:cNvGrpSpPr/>
+        <p:nvPr/>
+      </p:nvGrpSpPr>
+      <p:grpSpPr>
+        <a:xfrm>
+          <a:off x="0" y="0"/>
+          <a:ext cx="0" cy="0"/>
+          <a:chOff x="0" y="0"/>
+          <a:chExt cx="0" cy="0"/>
+        </a:xfrm>
+      </p:grpSpPr>
+      <p:sp>
+        <p:nvSpPr>
+          <p:cNvPr id="4" name="Rectangle 2">
+            <a:extLst>
+              <a:ext uri="{FF2B5EF4-FFF2-40B4-BE49-F238E27FC236}">
+                <a16:creationId xmlns:a16="http://schemas.microsoft.com/office/drawing/2014/main" id="{77E43016-4089-C5D0-9FDA-5C661C3727DC}"/>
+              </a:ext>
+            </a:extLst>
+          </p:cNvPr>
+          <p:cNvSpPr>
+            <a:spLocks noChangeArrowheads="1"/>
+          </p:cNvSpPr>
+          <p:nvPr/>
+        </p:nvSpPr>
+        <p:spPr bwMode="auto">
+          <a:xfrm>
+            <a:off x="0" y="105489"/>
+            <a:ext cx="1999265" cy="246221"/>
+          </a:xfrm>
+          <a:prstGeom prst="rect">
+            <a:avLst/>
+          </a:prstGeom>
+          <a:solidFill>
+            <a:srgbClr val="FFFFFF"/>
+          </a:solidFill>
+          <a:ln>
+            <a:noFill/>
+          </a:ln>
+          <a:effectLst/>
+          <a:extLst>
+            <a:ext uri="{91240B29-F687-4F45-9708-019B960494DF}">
+              <a14:hiddenLine xmlns:a14="http://schemas.microsoft.com/office/drawing/2010/main" w="9525">
+                <a:solidFill>
+                  <a:schemeClr val="tx1"/>
+                </a:solidFill>
+                <a:miter lim="800000"/>
+                <a:headEnd/>
+                <a:tailEnd/>
+              </a14:hiddenLine>
+            </a:ext>
+            <a:ext uri="{AF507438-7753-43E0-B8FC-AC1667EBCBE1}">
+              <a14:hiddenEffects xmlns:a14="http://schemas.microsoft.com/office/drawing/2010/main">
+                <a:effectLst>
+                  <a:outerShdw dist="35921" dir="2700000" algn="ctr" rotWithShape="0">
+                    <a:schemeClr val="bg2"/>
+                  </a:outerShdw>
+                </a:effectLst>
+              </a14:hiddenEffects>
+            </a:ext>
+          </a:extLst>
+        </p:spPr>
+        <p:txBody>
+          <a:bodyPr vert="horz" wrap="none" lIns="91440" tIns="45720" rIns="91440" bIns="45720" numCol="1" anchor="ctr" anchorCtr="0" compatLnSpc="1">
+            <a:prstTxWarp prst="textNoShape">
+              <a:avLst/>
+            </a:prstTxWarp>
+            <a:spAutoFit/>
+          </a:bodyPr>
+          <a:lstStyle/>
+          <a:p>
+            <a:pPr marL="0" marR="0" lvl="0" indent="0" algn="l" defTabSz="914400" rtl="0" eaLnBrk="0" fontAlgn="base" latinLnBrk="0" hangingPunct="0">
+              <a:lnSpc>
+                <a:spcPct val="100000"/>
+              </a:lnSpc>
+              <a:spcBef>
+                <a:spcPct val="0"/>
+              </a:spcBef>
+              <a:spcAft>
+                <a:spcPct val="0"/>
+              </a:spcAft>
+              <a:buClrTx/>
+              <a:buSzTx/>
+              <a:buFontTx/>
+              <a:buNone/>
+              <a:tabLst/>
+            </a:pPr>
+            <a:r>
+              <a:rPr kumimoji="0" lang="de-DE" altLang="de-DE" sz="1000" b="0" i="0" u="none" strike="noStrike" cap="none" normalizeH="0" baseline="0" dirty="0">
+                <a:ln>
+                  <a:noFill/>
+                </a:ln>
+                <a:solidFill>
+                  <a:srgbClr val="067D17"/>
+                </a:solidFill>
+                <a:effectLst/>
+                <a:latin typeface="JetBrains Mono"/>
+              </a:rPr>
+              <a:t>ABCDEFGHJKLMNOPQRSTUVWXYZ</a:t>
+            </a:r>
+            <a:endParaRPr kumimoji="0" lang="de-DE" altLang="de-DE" sz="1800" b="0" i="0" u="none" strike="noStrike" cap="none" normalizeH="0" baseline="0" dirty="0">
+              <a:ln>
+                <a:noFill/>
+              </a:ln>
+              <a:solidFill>
+                <a:schemeClr val="tx1"/>
+              </a:solidFill>
+              <a:effectLst/>
+              <a:latin typeface="Arial" panose="020B0604020202020204" pitchFamily="34" charset="0"/>
+            </a:endParaRPr>
+          </a:p>
+        </p:txBody>
+      </p:sp>
+    </p:spTree>
+    <p:extLst>
+      <p:ext uri="{BB962C8B-B14F-4D97-AF65-F5344CB8AC3E}">
+        <p14:creationId xmlns:p14="http://schemas.microsoft.com/office/powerpoint/2010/main" val="3427518050"/>
       </p:ext>
     </p:extLst>
   </p:cSld>

</xml_diff>